<commit_message>
re formated and added notes in ppt
</commit_message>
<xml_diff>
--- a/HybridApp-powerpoint.pptx
+++ b/HybridApp-powerpoint.pptx
@@ -6,7 +6,7 @@
     <p:sldMasterId id="2147483660" r:id="rId2"/>
   </p:sldMasterIdLst>
   <p:notesMasterIdLst>
-    <p:notesMasterId r:id="rId25"/>
+    <p:notesMasterId r:id="rId26"/>
   </p:notesMasterIdLst>
   <p:sldIdLst>
     <p:sldId id="278" r:id="rId3"/>
@@ -16,26 +16,27 @@
     <p:sldId id="293" r:id="rId7"/>
     <p:sldId id="294" r:id="rId8"/>
     <p:sldId id="295" r:id="rId9"/>
-    <p:sldId id="296" r:id="rId10"/>
-    <p:sldId id="297" r:id="rId11"/>
-    <p:sldId id="282" r:id="rId12"/>
-    <p:sldId id="298" r:id="rId13"/>
-    <p:sldId id="280" r:id="rId14"/>
-    <p:sldId id="284" r:id="rId15"/>
-    <p:sldId id="281" r:id="rId16"/>
-    <p:sldId id="279" r:id="rId17"/>
-    <p:sldId id="283" r:id="rId18"/>
-    <p:sldId id="285" r:id="rId19"/>
-    <p:sldId id="286" r:id="rId20"/>
-    <p:sldId id="287" r:id="rId21"/>
-    <p:sldId id="288" r:id="rId22"/>
-    <p:sldId id="289" r:id="rId23"/>
-    <p:sldId id="262" r:id="rId24"/>
+    <p:sldId id="300" r:id="rId10"/>
+    <p:sldId id="296" r:id="rId11"/>
+    <p:sldId id="297" r:id="rId12"/>
+    <p:sldId id="282" r:id="rId13"/>
+    <p:sldId id="298" r:id="rId14"/>
+    <p:sldId id="280" r:id="rId15"/>
+    <p:sldId id="284" r:id="rId16"/>
+    <p:sldId id="281" r:id="rId17"/>
+    <p:sldId id="279" r:id="rId18"/>
+    <p:sldId id="283" r:id="rId19"/>
+    <p:sldId id="285" r:id="rId20"/>
+    <p:sldId id="286" r:id="rId21"/>
+    <p:sldId id="287" r:id="rId22"/>
+    <p:sldId id="288" r:id="rId23"/>
+    <p:sldId id="289" r:id="rId24"/>
+    <p:sldId id="262" r:id="rId25"/>
   </p:sldIdLst>
   <p:sldSz cx="9144000" cy="6858000" type="screen4x3"/>
   <p:notesSz cx="6858000" cy="9144000"/>
   <p:custDataLst>
-    <p:tags r:id="rId26"/>
+    <p:tags r:id="rId27"/>
   </p:custDataLst>
   <p:defaultTextStyle>
     <a:defPPr>
@@ -1278,7 +1279,7 @@
   <dgm:whole/>
   <dgm:extLst>
     <a:ext uri="http://schemas.microsoft.com/office/drawing/2008/diagram">
-      <dsp:dataModelExt xmlns:dsp="http://schemas.microsoft.com/office/drawing/2008/diagram" relId="rId10" minVer="http://schemas.openxmlformats.org/drawingml/2006/diagram"/>
+      <dsp:dataModelExt xmlns:dsp="http://schemas.microsoft.com/office/drawing/2008/diagram" relId="rId11" minVer="http://schemas.openxmlformats.org/drawingml/2006/diagram"/>
     </a:ext>
   </dgm:extLst>
 </dgm:dataModel>
@@ -5398,27 +5399,20 @@
         </p:nvSpPr>
         <p:spPr/>
         <p:txBody>
-          <a:bodyPr>
-            <a:normAutofit/>
-          </a:bodyPr>
+          <a:bodyPr/>
           <a:lstStyle/>
           <a:p>
             <a:r>
-              <a:rPr lang="en-US" dirty="0" smtClean="0"/>
-              <a:t>Add</a:t>
-            </a:r>
-            <a:r>
-              <a:rPr lang="en-US" baseline="0" dirty="0" smtClean="0"/>
-              <a:t> examples such as Angry Birds, </a:t>
-            </a:r>
-            <a:r>
-              <a:rPr lang="en-US" baseline="0" dirty="0" err="1" smtClean="0"/>
-              <a:t>Retrica</a:t>
-            </a:r>
-            <a:r>
-              <a:rPr lang="en-US" baseline="0" dirty="0" smtClean="0"/>
-              <a:t>(camera app).</a:t>
-            </a:r>
+              <a:rPr lang="en-IN" b="1" dirty="0" smtClean="0"/>
+              <a:t>White papers</a:t>
+            </a:r>
+            <a:r>
+              <a:rPr lang="en-IN" dirty="0" smtClean="0"/>
+              <a:t> are sales and marketing documents used to entice or persuade potential customers to learn more about or purchase a particular product, service, technology or methodology.</a:t>
+            </a:r>
+          </a:p>
+          <a:p>
+            <a:endParaRPr lang="en-IN" dirty="0"/>
           </a:p>
         </p:txBody>
       </p:sp>
@@ -5440,7 +5434,7 @@
             <a:fld id="{36F078DE-0EAB-43EC-B0D5-FB8279C2ECBF}" type="slidenum">
               <a:rPr lang="en-US" smtClean="0"/>
               <a:pPr/>
-              <a:t>3</a:t>
+              <a:t>1</a:t>
             </a:fld>
             <a:endParaRPr lang="en-US" dirty="0"/>
           </a:p>
@@ -5449,7 +5443,7 @@
     </p:spTree>
     <p:extLst>
       <p:ext uri="{BB962C8B-B14F-4D97-AF65-F5344CB8AC3E}">
-        <p14:creationId xmlns:p14="http://schemas.microsoft.com/office/powerpoint/2010/main" val="1546896193"/>
+        <p14:creationId xmlns:p14="http://schemas.microsoft.com/office/powerpoint/2010/main" val="1637535594"/>
       </p:ext>
     </p:extLst>
   </p:cSld>
@@ -5505,22 +5499,125 @@
           </a:bodyPr>
           <a:lstStyle/>
           <a:p>
-            <a:pPr marL="0" marR="0" indent="0" algn="l" defTabSz="914400" rtl="0" eaLnBrk="1" fontAlgn="auto" latinLnBrk="0" hangingPunct="1">
-              <a:lnSpc>
-                <a:spcPct val="100000"/>
-              </a:lnSpc>
-              <a:spcBef>
-                <a:spcPts val="0"/>
-              </a:spcBef>
-              <a:spcAft>
-                <a:spcPts val="0"/>
-              </a:spcAft>
-              <a:buClrTx/>
-              <a:buSzTx/>
-              <a:buFontTx/>
-              <a:buNone/>
-              <a:tabLst/>
-              <a:defRPr/>
+            <a:pPr marL="171450" indent="-171450">
+              <a:buFont typeface="Arial" panose="020B0604020202020204" pitchFamily="34" charset="0"/>
+              <a:buChar char="•"/>
+            </a:pPr>
+            <a:r>
+              <a:rPr lang="en-IN" sz="1200" b="0" i="0" u="none" strike="noStrike" kern="1200" baseline="0" dirty="0" smtClean="0">
+                <a:solidFill>
+                  <a:schemeClr val="tx1"/>
+                </a:solidFill>
+                <a:latin typeface="+mn-lt"/>
+                <a:ea typeface="+mn-ea"/>
+                <a:cs typeface="+mn-cs"/>
+              </a:rPr>
+              <a:t>Native apps have binary executable files that are downloaded</a:t>
+            </a:r>
+          </a:p>
+          <a:p>
+            <a:r>
+              <a:rPr lang="en-IN" sz="1200" b="0" i="0" u="none" strike="noStrike" kern="1200" baseline="0" dirty="0" smtClean="0">
+                <a:solidFill>
+                  <a:schemeClr val="tx1"/>
+                </a:solidFill>
+                <a:latin typeface="+mn-lt"/>
+                <a:ea typeface="+mn-ea"/>
+                <a:cs typeface="+mn-cs"/>
+              </a:rPr>
+              <a:t>directly to the device and stored locally. </a:t>
+            </a:r>
+          </a:p>
+          <a:p>
+            <a:pPr marL="171450" indent="-171450">
+              <a:buFont typeface="Arial" panose="020B0604020202020204" pitchFamily="34" charset="0"/>
+              <a:buChar char="•"/>
+            </a:pPr>
+            <a:r>
+              <a:rPr lang="en-IN" sz="1200" b="0" i="0" u="none" strike="noStrike" kern="1200" baseline="0" dirty="0" smtClean="0">
+                <a:solidFill>
+                  <a:schemeClr val="tx1"/>
+                </a:solidFill>
+                <a:latin typeface="+mn-lt"/>
+                <a:ea typeface="+mn-ea"/>
+                <a:cs typeface="+mn-cs"/>
+              </a:rPr>
+              <a:t>The installation process</a:t>
+            </a:r>
+          </a:p>
+          <a:p>
+            <a:r>
+              <a:rPr lang="en-IN" sz="1200" b="0" i="0" u="none" strike="noStrike" kern="1200" baseline="0" dirty="0" smtClean="0">
+                <a:solidFill>
+                  <a:schemeClr val="tx1"/>
+                </a:solidFill>
+                <a:latin typeface="+mn-lt"/>
+                <a:ea typeface="+mn-ea"/>
+                <a:cs typeface="+mn-cs"/>
+              </a:rPr>
+              <a:t>can be initiated by the user or vendor company. </a:t>
+            </a:r>
+          </a:p>
+          <a:p>
+            <a:pPr marL="171450" indent="-171450">
+              <a:buFont typeface="Arial" panose="020B0604020202020204" pitchFamily="34" charset="0"/>
+              <a:buChar char="•"/>
+            </a:pPr>
+            <a:r>
+              <a:rPr lang="en-IN" sz="1200" b="0" i="0" u="none" strike="noStrike" kern="1200" baseline="0" dirty="0" smtClean="0">
+                <a:solidFill>
+                  <a:schemeClr val="tx1"/>
+                </a:solidFill>
+                <a:latin typeface="+mn-lt"/>
+                <a:ea typeface="+mn-ea"/>
+                <a:cs typeface="+mn-cs"/>
+              </a:rPr>
+              <a:t>The most popular way to download a</a:t>
+            </a:r>
+          </a:p>
+          <a:p>
+            <a:r>
+              <a:rPr lang="en-IN" sz="1200" b="0" i="0" u="none" strike="noStrike" kern="1200" baseline="0" dirty="0" smtClean="0">
+                <a:solidFill>
+                  <a:schemeClr val="tx1"/>
+                </a:solidFill>
+                <a:latin typeface="+mn-lt"/>
+                <a:ea typeface="+mn-ea"/>
+                <a:cs typeface="+mn-cs"/>
+              </a:rPr>
+              <a:t>native app is by visiting an app store, such as Apple’s App Store,</a:t>
+            </a:r>
+          </a:p>
+          <a:p>
+            <a:r>
+              <a:rPr lang="en-IN" sz="1200" b="0" i="0" u="none" strike="noStrike" kern="1200" baseline="0" dirty="0" smtClean="0">
+                <a:solidFill>
+                  <a:schemeClr val="tx1"/>
+                </a:solidFill>
+                <a:latin typeface="+mn-lt"/>
+                <a:ea typeface="+mn-ea"/>
+                <a:cs typeface="+mn-cs"/>
+              </a:rPr>
+              <a:t>Android’s Marketplace or BlackBerry’s App World, but other</a:t>
+            </a:r>
+          </a:p>
+          <a:p>
+            <a:r>
+              <a:rPr lang="en-IN" sz="1200" b="0" i="0" u="none" strike="noStrike" kern="1200" baseline="0" dirty="0" smtClean="0">
+                <a:solidFill>
+                  <a:schemeClr val="tx1"/>
+                </a:solidFill>
+                <a:latin typeface="+mn-lt"/>
+                <a:ea typeface="+mn-ea"/>
+                <a:cs typeface="+mn-cs"/>
+              </a:rPr>
+              <a:t>methods exist and are sometimes provided by the mobile vendor.</a:t>
+            </a:r>
+          </a:p>
+          <a:p>
+            <a:pPr marL="171450" indent="-171450">
+              <a:buFont typeface="Arial" panose="020B0604020202020204" pitchFamily="34" charset="0"/>
+              <a:buChar char="•"/>
             </a:pPr>
             <a:r>
               <a:rPr lang="en-US" dirty="0" smtClean="0"/>
@@ -5528,20 +5625,20 @@
             </a:r>
             <a:r>
               <a:rPr lang="en-US" baseline="0" dirty="0" smtClean="0"/>
-              <a:t> examples such as Google docs, </a:t>
+              <a:t> </a:t>
+            </a:r>
+            <a:r>
+              <a:rPr lang="en-US" baseline="0" dirty="0" smtClean="0"/>
+              <a:t>examples such as Angry Birds, </a:t>
             </a:r>
             <a:r>
               <a:rPr lang="en-US" baseline="0" dirty="0" err="1" smtClean="0"/>
-              <a:t>icloud</a:t>
-            </a:r>
-            <a:r>
-              <a:rPr lang="en-US" baseline="0" smtClean="0"/>
-              <a:t>.</a:t>
-            </a:r>
-            <a:endParaRPr lang="en-US" baseline="0" dirty="0" smtClean="0"/>
-          </a:p>
-          <a:p>
-            <a:endParaRPr lang="en-US" dirty="0"/>
+              <a:t>Retrica</a:t>
+            </a:r>
+            <a:r>
+              <a:rPr lang="en-US" baseline="0" dirty="0" smtClean="0"/>
+              <a:t>(camera app).</a:t>
+            </a:r>
           </a:p>
         </p:txBody>
       </p:sp>
@@ -5563,7 +5660,7 @@
             <a:fld id="{36F078DE-0EAB-43EC-B0D5-FB8279C2ECBF}" type="slidenum">
               <a:rPr lang="en-US" smtClean="0"/>
               <a:pPr/>
-              <a:t>6</a:t>
+              <a:t>3</a:t>
             </a:fld>
             <a:endParaRPr lang="en-US" dirty="0"/>
           </a:p>
@@ -5572,7 +5669,7 @@
     </p:spTree>
     <p:extLst>
       <p:ext uri="{BB962C8B-B14F-4D97-AF65-F5344CB8AC3E}">
-        <p14:creationId xmlns:p14="http://schemas.microsoft.com/office/powerpoint/2010/main" val="4253609220"/>
+        <p14:creationId xmlns:p14="http://schemas.microsoft.com/office/powerpoint/2010/main" val="1546896193"/>
       </p:ext>
     </p:extLst>
   </p:cSld>
@@ -5623,17 +5720,15 @@
         </p:nvSpPr>
         <p:spPr/>
         <p:txBody>
-          <a:bodyPr>
-            <a:normAutofit/>
-          </a:bodyPr>
+          <a:bodyPr/>
           <a:lstStyle/>
           <a:p>
-            <a:pPr>
-              <a:buFont typeface="Arial" pitchFamily="34" charset="0"/>
+            <a:pPr marL="171450" indent="-171450">
+              <a:buFont typeface="Arial" panose="020B0604020202020204" pitchFamily="34" charset="0"/>
               <a:buChar char="•"/>
             </a:pPr>
             <a:r>
-              <a:rPr lang="en-US" sz="1200" kern="1200" baseline="0" dirty="0" smtClean="0">
+              <a:rPr lang="en-IN" sz="1200" b="0" i="0" u="none" strike="noStrike" kern="1200" baseline="0" dirty="0" smtClean="0">
                 <a:solidFill>
                   <a:schemeClr val="tx1"/>
                 </a:solidFill>
@@ -5641,16 +5736,12 @@
                 <a:ea typeface="+mn-ea"/>
                 <a:cs typeface="+mn-cs"/>
               </a:rPr>
-              <a:t>The native portion of the application uses the operating system APIs to create an embedded HTML rendering engine that serves as a bridge between the browser and the device APIs.</a:t>
-            </a:r>
-          </a:p>
-          <a:p>
-            <a:pPr>
-              <a:buFont typeface="Arial" pitchFamily="34" charset="0"/>
-              <a:buChar char="•"/>
-            </a:pPr>
-            <a:r>
-              <a:rPr lang="en-US" sz="1200" kern="1200" baseline="0" dirty="0" smtClean="0">
+              <a:t>Once the native application is installed on the mobile device</a:t>
+            </a:r>
+          </a:p>
+          <a:p>
+            <a:r>
+              <a:rPr lang="en-IN" sz="1200" b="0" i="0" u="none" strike="noStrike" kern="1200" baseline="0" dirty="0" smtClean="0">
                 <a:solidFill>
                   <a:schemeClr val="tx1"/>
                 </a:solidFill>
@@ -5658,9 +5749,65 @@
                 <a:ea typeface="+mn-ea"/>
                 <a:cs typeface="+mn-cs"/>
               </a:rPr>
-              <a:t>This bridge enables the hybrid app to take full advantage of all the features that modern devices have to offer.</a:t>
-            </a:r>
-            <a:endParaRPr lang="en-US" dirty="0"/>
+              <a:t>and launched by the user, it interacts with the mobile operating</a:t>
+            </a:r>
+          </a:p>
+          <a:p>
+            <a:r>
+              <a:rPr lang="en-IN" sz="1200" b="0" i="0" u="none" strike="noStrike" kern="1200" baseline="0" dirty="0" smtClean="0">
+                <a:solidFill>
+                  <a:schemeClr val="tx1"/>
+                </a:solidFill>
+                <a:latin typeface="+mn-lt"/>
+                <a:ea typeface="+mn-ea"/>
+                <a:cs typeface="+mn-cs"/>
+              </a:rPr>
+              <a:t>system through proprietary API calls that the operating system</a:t>
+            </a:r>
+          </a:p>
+          <a:p>
+            <a:r>
+              <a:rPr lang="en-IN" sz="1200" b="0" i="0" u="none" strike="noStrike" kern="1200" baseline="0" dirty="0" smtClean="0">
+                <a:solidFill>
+                  <a:schemeClr val="tx1"/>
+                </a:solidFill>
+                <a:latin typeface="+mn-lt"/>
+                <a:ea typeface="+mn-ea"/>
+                <a:cs typeface="+mn-cs"/>
+              </a:rPr>
+              <a:t>exposes.</a:t>
+            </a:r>
+          </a:p>
+          <a:p>
+            <a:pPr marL="171450" indent="-171450">
+              <a:buFont typeface="Arial" panose="020B0604020202020204" pitchFamily="34" charset="0"/>
+              <a:buChar char="•"/>
+            </a:pPr>
+            <a:r>
+              <a:rPr lang="en-IN" sz="1200" b="0" i="0" u="none" strike="noStrike" kern="1200" baseline="0" dirty="0" smtClean="0">
+                <a:solidFill>
+                  <a:schemeClr val="tx1"/>
+                </a:solidFill>
+                <a:latin typeface="+mn-lt"/>
+                <a:ea typeface="+mn-ea"/>
+                <a:cs typeface="+mn-cs"/>
+              </a:rPr>
+              <a:t> These can be divided into two groups: low-level APIs</a:t>
+            </a:r>
+          </a:p>
+          <a:p>
+            <a:r>
+              <a:rPr lang="en-IN" sz="1200" b="0" i="0" u="none" strike="noStrike" kern="1200" baseline="0" dirty="0" smtClean="0">
+                <a:solidFill>
+                  <a:schemeClr val="tx1"/>
+                </a:solidFill>
+                <a:latin typeface="+mn-lt"/>
+                <a:ea typeface="+mn-ea"/>
+                <a:cs typeface="+mn-cs"/>
+              </a:rPr>
+              <a:t>and high-level APIs.</a:t>
+            </a:r>
+            <a:endParaRPr lang="en-IN" dirty="0"/>
           </a:p>
         </p:txBody>
       </p:sp>
@@ -5682,7 +5829,7 @@
             <a:fld id="{36F078DE-0EAB-43EC-B0D5-FB8279C2ECBF}" type="slidenum">
               <a:rPr lang="en-US" smtClean="0"/>
               <a:pPr/>
-              <a:t>8</a:t>
+              <a:t>4</a:t>
             </a:fld>
             <a:endParaRPr lang="en-US" dirty="0"/>
           </a:p>
@@ -5691,7 +5838,7 @@
     </p:spTree>
     <p:extLst>
       <p:ext uri="{BB962C8B-B14F-4D97-AF65-F5344CB8AC3E}">
-        <p14:creationId xmlns:p14="http://schemas.microsoft.com/office/powerpoint/2010/main" val="3917493518"/>
+        <p14:creationId xmlns:p14="http://schemas.microsoft.com/office/powerpoint/2010/main" val="1474484259"/>
       </p:ext>
     </p:extLst>
   </p:cSld>
@@ -5742,10 +5889,170 @@
         </p:nvSpPr>
         <p:spPr/>
         <p:txBody>
-          <a:bodyPr/>
+          <a:bodyPr>
+            <a:normAutofit/>
+          </a:bodyPr>
           <a:lstStyle/>
           <a:p>
-            <a:pPr marL="0" marR="0" lvl="0" indent="0" algn="l" defTabSz="914400" rtl="0" eaLnBrk="1" fontAlgn="auto" latinLnBrk="0" hangingPunct="1">
+            <a:pPr marL="171450" indent="-171450">
+              <a:buFont typeface="Arial" panose="020B0604020202020204" pitchFamily="34" charset="0"/>
+              <a:buChar char="•"/>
+            </a:pPr>
+            <a:r>
+              <a:rPr lang="en-IN" sz="1200" b="0" i="0" u="none" strike="noStrike" kern="1200" baseline="0" dirty="0" smtClean="0">
+                <a:solidFill>
+                  <a:schemeClr val="tx1"/>
+                </a:solidFill>
+                <a:latin typeface="+mn-lt"/>
+                <a:ea typeface="+mn-ea"/>
+                <a:cs typeface="+mn-cs"/>
+              </a:rPr>
+              <a:t>some companies go even further and</a:t>
+            </a:r>
+          </a:p>
+          <a:p>
+            <a:r>
+              <a:rPr lang="en-IN" sz="1200" b="0" i="0" u="none" strike="noStrike" kern="1200" baseline="0" dirty="0" smtClean="0">
+                <a:solidFill>
+                  <a:schemeClr val="tx1"/>
+                </a:solidFill>
+                <a:latin typeface="+mn-lt"/>
+                <a:ea typeface="+mn-ea"/>
+                <a:cs typeface="+mn-cs"/>
+              </a:rPr>
+              <a:t>enhance the user experience by creating a mobile website that</a:t>
+            </a:r>
+          </a:p>
+          <a:p>
+            <a:r>
+              <a:rPr lang="en-IN" sz="1200" b="0" i="0" u="none" strike="noStrike" kern="1200" baseline="0" dirty="0" smtClean="0">
+                <a:solidFill>
+                  <a:schemeClr val="tx1"/>
+                </a:solidFill>
+                <a:latin typeface="+mn-lt"/>
+                <a:ea typeface="+mn-ea"/>
+                <a:cs typeface="+mn-cs"/>
+              </a:rPr>
+              <a:t>looks like a native app and can be launched from a shortcut that</a:t>
+            </a:r>
+          </a:p>
+          <a:p>
+            <a:r>
+              <a:rPr lang="en-IN" sz="1200" b="0" i="0" u="none" strike="noStrike" kern="1200" baseline="0" dirty="0" smtClean="0">
+                <a:solidFill>
+                  <a:schemeClr val="tx1"/>
+                </a:solidFill>
+                <a:latin typeface="+mn-lt"/>
+                <a:ea typeface="+mn-ea"/>
+                <a:cs typeface="+mn-cs"/>
+              </a:rPr>
+              <a:t>is indistinguishable from that used to launch native apps.</a:t>
+            </a:r>
+          </a:p>
+          <a:p>
+            <a:pPr marL="171450" indent="-171450">
+              <a:buFont typeface="Arial" panose="020B0604020202020204" pitchFamily="34" charset="0"/>
+              <a:buChar char="•"/>
+            </a:pPr>
+            <a:r>
+              <a:rPr lang="en-IN" sz="1200" b="0" i="0" u="none" strike="noStrike" kern="1200" baseline="0" dirty="0" smtClean="0">
+                <a:solidFill>
+                  <a:schemeClr val="tx1"/>
+                </a:solidFill>
+                <a:latin typeface="+mn-lt"/>
+                <a:ea typeface="+mn-ea"/>
+                <a:cs typeface="+mn-cs"/>
+              </a:rPr>
+              <a:t>One of the most prominent advantages of a web app is its multiplatform</a:t>
+            </a:r>
+          </a:p>
+          <a:p>
+            <a:r>
+              <a:rPr lang="en-IN" sz="1200" b="0" i="0" u="none" strike="noStrike" kern="1200" baseline="0" dirty="0" smtClean="0">
+                <a:solidFill>
+                  <a:schemeClr val="tx1"/>
+                </a:solidFill>
+                <a:latin typeface="+mn-lt"/>
+                <a:ea typeface="+mn-ea"/>
+                <a:cs typeface="+mn-cs"/>
+              </a:rPr>
+              <a:t>support and low cost of development.</a:t>
+            </a:r>
+          </a:p>
+          <a:p>
+            <a:pPr marL="171450" indent="-171450">
+              <a:buFont typeface="Arial" panose="020B0604020202020204" pitchFamily="34" charset="0"/>
+              <a:buChar char="•"/>
+            </a:pPr>
+            <a:r>
+              <a:rPr lang="en-IN" sz="1200" b="0" i="0" u="none" strike="noStrike" kern="1200" baseline="0" dirty="0" smtClean="0">
+                <a:solidFill>
+                  <a:schemeClr val="tx1"/>
+                </a:solidFill>
+                <a:latin typeface="+mn-lt"/>
+                <a:ea typeface="+mn-ea"/>
+                <a:cs typeface="+mn-cs"/>
+              </a:rPr>
+              <a:t>Most mobile vendors utilize the same rendering engine in their browsers,</a:t>
+            </a:r>
+          </a:p>
+          <a:p>
+            <a:r>
+              <a:rPr lang="en-IN" sz="1200" b="0" i="0" u="none" strike="noStrike" kern="1200" baseline="0" dirty="0" err="1" smtClean="0">
+                <a:solidFill>
+                  <a:schemeClr val="tx1"/>
+                </a:solidFill>
+                <a:latin typeface="+mn-lt"/>
+                <a:ea typeface="+mn-ea"/>
+                <a:cs typeface="+mn-cs"/>
+              </a:rPr>
+              <a:t>WebKit</a:t>
+            </a:r>
+            <a:r>
+              <a:rPr lang="en-IN" sz="1200" b="0" i="0" u="none" strike="noStrike" kern="1200" baseline="0" dirty="0" smtClean="0">
+                <a:solidFill>
+                  <a:schemeClr val="tx1"/>
+                </a:solidFill>
+                <a:latin typeface="+mn-lt"/>
+                <a:ea typeface="+mn-ea"/>
+                <a:cs typeface="+mn-cs"/>
+              </a:rPr>
+              <a:t>—an open-source project led mainly by Google and</a:t>
+            </a:r>
+          </a:p>
+          <a:p>
+            <a:r>
+              <a:rPr lang="en-IN" sz="1200" b="0" i="0" u="none" strike="noStrike" kern="1200" baseline="0" dirty="0" smtClean="0">
+                <a:solidFill>
+                  <a:schemeClr val="tx1"/>
+                </a:solidFill>
+                <a:latin typeface="+mn-lt"/>
+                <a:ea typeface="+mn-ea"/>
+                <a:cs typeface="+mn-cs"/>
+              </a:rPr>
+              <a:t>Apple that provides the most comprehensive HTML5</a:t>
+            </a:r>
+          </a:p>
+          <a:p>
+            <a:pPr marL="171450" indent="-171450">
+              <a:buFont typeface="Arial" panose="020B0604020202020204" pitchFamily="34" charset="0"/>
+              <a:buChar char="•"/>
+            </a:pPr>
+            <a:r>
+              <a:rPr lang="en-IN" sz="1200" b="0" i="0" u="none" strike="noStrike" kern="1200" baseline="0" dirty="0" smtClean="0">
+                <a:solidFill>
+                  <a:schemeClr val="tx1"/>
+                </a:solidFill>
+                <a:latin typeface="+mn-lt"/>
+                <a:ea typeface="+mn-ea"/>
+                <a:cs typeface="+mn-cs"/>
+              </a:rPr>
+              <a:t>web apps run within the browser</a:t>
+            </a:r>
+            <a:endParaRPr lang="en-US" dirty="0" smtClean="0"/>
+          </a:p>
+          <a:p>
+            <a:pPr marL="171450" marR="0" indent="-171450" algn="l" defTabSz="914400" rtl="0" eaLnBrk="1" fontAlgn="auto" latinLnBrk="0" hangingPunct="1">
               <a:lnSpc>
                 <a:spcPct val="100000"/>
               </a:lnSpc>
@@ -5757,238 +6064,519 @@
               </a:spcAft>
               <a:buClrTx/>
               <a:buSzTx/>
-              <a:buFontTx/>
-              <a:buNone/>
+              <a:buFont typeface="Arial" panose="020B0604020202020204" pitchFamily="34" charset="0"/>
+              <a:buChar char="•"/>
               <a:tabLst/>
               <a:defRPr/>
             </a:pPr>
             <a:r>
-              <a:rPr kumimoji="0" lang="en-US" sz="1200" b="0" i="0" u="none" strike="noStrike" kern="1200" cap="none" spc="0" normalizeH="0" baseline="0" noProof="0" dirty="0" smtClean="0">
-                <a:ln>
-                  <a:noFill/>
-                </a:ln>
+              <a:rPr lang="en-US" dirty="0" smtClean="0"/>
+              <a:t>Add</a:t>
+            </a:r>
+            <a:r>
+              <a:rPr lang="en-US" baseline="0" dirty="0" smtClean="0"/>
+              <a:t> </a:t>
+            </a:r>
+            <a:r>
+              <a:rPr lang="en-US" baseline="0" dirty="0" smtClean="0"/>
+              <a:t>examples such as Google docs, </a:t>
+            </a:r>
+            <a:r>
+              <a:rPr lang="en-US" baseline="0" dirty="0" err="1" smtClean="0"/>
+              <a:t>icloud</a:t>
+            </a:r>
+            <a:r>
+              <a:rPr lang="en-US" baseline="0" dirty="0" smtClean="0"/>
+              <a:t>.</a:t>
+            </a:r>
+          </a:p>
+          <a:p>
+            <a:endParaRPr lang="en-US" dirty="0"/>
+          </a:p>
+        </p:txBody>
+      </p:sp>
+      <p:sp>
+        <p:nvSpPr>
+          <p:cNvPr id="4" name="Slide Number Placeholder 3"/>
+          <p:cNvSpPr>
+            <a:spLocks noGrp="1"/>
+          </p:cNvSpPr>
+          <p:nvPr>
+            <p:ph type="sldNum" sz="quarter" idx="10"/>
+          </p:nvPr>
+        </p:nvSpPr>
+        <p:spPr/>
+        <p:txBody>
+          <a:bodyPr/>
+          <a:lstStyle/>
+          <a:p>
+            <a:fld id="{36F078DE-0EAB-43EC-B0D5-FB8279C2ECBF}" type="slidenum">
+              <a:rPr lang="en-US" smtClean="0"/>
+              <a:pPr/>
+              <a:t>6</a:t>
+            </a:fld>
+            <a:endParaRPr lang="en-US" dirty="0"/>
+          </a:p>
+        </p:txBody>
+      </p:sp>
+    </p:spTree>
+    <p:extLst>
+      <p:ext uri="{BB962C8B-B14F-4D97-AF65-F5344CB8AC3E}">
+        <p14:creationId xmlns:p14="http://schemas.microsoft.com/office/powerpoint/2010/main" val="4253609220"/>
+      </p:ext>
+    </p:extLst>
+  </p:cSld>
+  <p:clrMapOvr>
+    <a:masterClrMapping/>
+  </p:clrMapOvr>
+</p:notes>
+</file>
+
+<file path=ppt/notesSlides/notesSlide5.xml><?xml version="1.0" encoding="utf-8"?>
+<p:notes xmlns:a="http://schemas.openxmlformats.org/drawingml/2006/main" xmlns:r="http://schemas.openxmlformats.org/officeDocument/2006/relationships" xmlns:p="http://schemas.openxmlformats.org/presentationml/2006/main">
+  <p:cSld>
+    <p:spTree>
+      <p:nvGrpSpPr>
+        <p:cNvPr id="1" name=""/>
+        <p:cNvGrpSpPr/>
+        <p:nvPr/>
+      </p:nvGrpSpPr>
+      <p:grpSpPr>
+        <a:xfrm>
+          <a:off x="0" y="0"/>
+          <a:ext cx="0" cy="0"/>
+          <a:chOff x="0" y="0"/>
+          <a:chExt cx="0" cy="0"/>
+        </a:xfrm>
+      </p:grpSpPr>
+      <p:sp>
+        <p:nvSpPr>
+          <p:cNvPr id="2" name="Slide Image Placeholder 1"/>
+          <p:cNvSpPr>
+            <a:spLocks noGrp="1" noRot="1" noChangeAspect="1"/>
+          </p:cNvSpPr>
+          <p:nvPr>
+            <p:ph type="sldImg"/>
+          </p:nvPr>
+        </p:nvSpPr>
+        <p:spPr/>
+      </p:sp>
+      <p:sp>
+        <p:nvSpPr>
+          <p:cNvPr id="3" name="Notes Placeholder 2"/>
+          <p:cNvSpPr>
+            <a:spLocks noGrp="1"/>
+          </p:cNvSpPr>
+          <p:nvPr>
+            <p:ph type="body" idx="1"/>
+          </p:nvPr>
+        </p:nvSpPr>
+        <p:spPr/>
+        <p:txBody>
+          <a:bodyPr/>
+          <a:lstStyle/>
+          <a:p>
+            <a:pPr marL="171450" indent="-171450">
+              <a:buFont typeface="Arial" panose="020B0604020202020204" pitchFamily="34" charset="0"/>
+              <a:buChar char="•"/>
+            </a:pPr>
+            <a:r>
+              <a:rPr lang="en-IN" sz="1200" b="0" i="0" u="none" strike="noStrike" kern="1200" baseline="0" dirty="0" smtClean="0">
                 <a:solidFill>
-                  <a:prstClr val="black"/>
+                  <a:schemeClr val="tx1"/>
                 </a:solidFill>
-                <a:effectLst/>
-                <a:uLnTx/>
-                <a:uFillTx/>
                 <a:latin typeface="+mn-lt"/>
                 <a:ea typeface="+mn-ea"/>
                 <a:cs typeface="+mn-cs"/>
               </a:rPr>
-              <a:t>You can remove this slide if you need. But we will strongly appreciate that you help us to spread the voice and let your colleagues and audience to download our free templates.</a:t>
-            </a:r>
-          </a:p>
-          <a:p>
-            <a:pPr marL="0" marR="0" lvl="0" indent="0" algn="l" defTabSz="914400" rtl="0" eaLnBrk="1" fontAlgn="auto" latinLnBrk="0" hangingPunct="1">
-              <a:lnSpc>
-                <a:spcPct val="100000"/>
-              </a:lnSpc>
-              <a:spcBef>
-                <a:spcPts val="0"/>
-              </a:spcBef>
-              <a:spcAft>
-                <a:spcPts val="0"/>
-              </a:spcAft>
-              <a:buClrTx/>
-              <a:buSzTx/>
-              <a:buFontTx/>
-              <a:buNone/>
-              <a:tabLst/>
-              <a:defRPr/>
-            </a:pPr>
-            <a:r>
-              <a:rPr kumimoji="0" lang="en-US" sz="1200" b="0" i="0" u="none" strike="noStrike" kern="1200" cap="none" spc="0" normalizeH="0" baseline="0" noProof="0" dirty="0" smtClean="0">
-                <a:ln>
-                  <a:noFill/>
-                </a:ln>
+              <a:t>The hybrid approach combines native development with web</a:t>
+            </a:r>
+          </a:p>
+          <a:p>
+            <a:r>
+              <a:rPr lang="en-IN" sz="1200" b="0" i="0" u="none" strike="noStrike" kern="1200" baseline="0" dirty="0" smtClean="0">
                 <a:solidFill>
-                  <a:prstClr val="black"/>
+                  <a:schemeClr val="tx1"/>
                 </a:solidFill>
-                <a:effectLst/>
-                <a:uLnTx/>
-                <a:uFillTx/>
                 <a:latin typeface="+mn-lt"/>
                 <a:ea typeface="+mn-ea"/>
                 <a:cs typeface="+mn-cs"/>
               </a:rPr>
-              <a:t>Here are a free resources:</a:t>
-            </a:r>
-          </a:p>
-          <a:p>
-            <a:pPr marL="0" marR="0" lvl="0" indent="0" algn="l" defTabSz="914400" rtl="0" eaLnBrk="1" fontAlgn="auto" latinLnBrk="0" hangingPunct="1">
-              <a:lnSpc>
-                <a:spcPct val="100000"/>
-              </a:lnSpc>
-              <a:spcBef>
-                <a:spcPts val="0"/>
-              </a:spcBef>
-              <a:spcAft>
-                <a:spcPts val="0"/>
-              </a:spcAft>
-              <a:buClrTx/>
-              <a:buSzTx/>
-              <a:buFontTx/>
-              <a:buNone/>
-              <a:tabLst/>
-              <a:defRPr/>
+              <a:t>technology.</a:t>
+            </a:r>
+          </a:p>
+          <a:p>
+            <a:pPr marL="171450" indent="-171450">
+              <a:buFont typeface="Arial" panose="020B0604020202020204" pitchFamily="34" charset="0"/>
+              <a:buChar char="•"/>
             </a:pPr>
             <a:r>
-              <a:rPr kumimoji="0" lang="en-US" sz="1200" b="0" i="0" u="none" strike="noStrike" kern="1200" cap="none" spc="0" normalizeH="0" baseline="0" noProof="0" dirty="0" smtClean="0">
-                <a:ln>
-                  <a:noFill/>
-                </a:ln>
+              <a:rPr lang="en-IN" sz="1200" b="0" i="0" u="none" strike="noStrike" kern="1200" baseline="0" dirty="0" smtClean="0">
                 <a:solidFill>
-                  <a:prstClr val="black"/>
+                  <a:schemeClr val="tx1"/>
                 </a:solidFill>
-                <a:effectLst/>
-                <a:uLnTx/>
-                <a:uFillTx/>
                 <a:latin typeface="+mn-lt"/>
                 <a:ea typeface="+mn-ea"/>
                 <a:cs typeface="+mn-cs"/>
               </a:rPr>
-              <a:t>Prepare your presentations: </a:t>
-            </a:r>
-            <a:r>
-              <a:rPr kumimoji="0" lang="en-US" sz="1200" b="1" i="0" u="none" strike="noStrike" kern="1200" cap="none" spc="0" normalizeH="0" baseline="0" noProof="0" dirty="0" smtClean="0">
-                <a:ln>
-                  <a:noFill/>
-                </a:ln>
+              <a:t>The native portion of the application uses the operating system</a:t>
+            </a:r>
+          </a:p>
+          <a:p>
+            <a:r>
+              <a:rPr lang="en-IN" sz="1200" b="0" i="0" u="none" strike="noStrike" kern="1200" baseline="0" dirty="0" smtClean="0">
                 <a:solidFill>
-                  <a:prstClr val="black"/>
+                  <a:schemeClr val="tx1"/>
                 </a:solidFill>
-                <a:effectLst/>
-                <a:uLnTx/>
-                <a:uFillTx/>
                 <a:latin typeface="+mn-lt"/>
                 <a:ea typeface="+mn-ea"/>
                 <a:cs typeface="+mn-cs"/>
               </a:rPr>
-              <a:t>SlideHunter.com</a:t>
-            </a:r>
-            <a:r>
-              <a:rPr kumimoji="0" lang="en-US" sz="1200" b="0" i="0" u="none" strike="noStrike" kern="1200" cap="none" spc="0" normalizeH="0" baseline="0" noProof="0" dirty="0" smtClean="0">
-                <a:ln>
-                  <a:noFill/>
-                </a:ln>
+              <a:t>APIs to create an embedded HTML rendering engine that</a:t>
+            </a:r>
+          </a:p>
+          <a:p>
+            <a:r>
+              <a:rPr lang="en-IN" sz="1200" b="0" i="0" u="none" strike="noStrike" kern="1200" baseline="0" dirty="0" smtClean="0">
                 <a:solidFill>
-                  <a:prstClr val="black"/>
+                  <a:schemeClr val="tx1"/>
                 </a:solidFill>
-                <a:effectLst/>
-                <a:uLnTx/>
-                <a:uFillTx/>
                 <a:latin typeface="+mn-lt"/>
                 <a:ea typeface="+mn-ea"/>
                 <a:cs typeface="+mn-cs"/>
               </a:rPr>
-              <a:t> lets you download free templates for your presentations.</a:t>
-            </a:r>
-          </a:p>
-          <a:p>
-            <a:pPr marL="0" marR="0" lvl="0" indent="0" algn="l" defTabSz="914400" rtl="0" eaLnBrk="1" fontAlgn="auto" latinLnBrk="0" hangingPunct="1">
-              <a:lnSpc>
-                <a:spcPct val="100000"/>
-              </a:lnSpc>
-              <a:spcBef>
-                <a:spcPts val="0"/>
-              </a:spcBef>
-              <a:spcAft>
-                <a:spcPts val="0"/>
-              </a:spcAft>
-              <a:buClrTx/>
-              <a:buSzTx/>
-              <a:buFontTx/>
-              <a:buNone/>
-              <a:tabLst/>
-              <a:defRPr/>
+              <a:t>serves as a bridge between the browser and the device APIs.</a:t>
+            </a:r>
+          </a:p>
+          <a:p>
+            <a:pPr marL="171450" indent="-171450">
+              <a:buFont typeface="Arial" panose="020B0604020202020204" pitchFamily="34" charset="0"/>
+              <a:buChar char="•"/>
             </a:pPr>
             <a:r>
-              <a:rPr kumimoji="0" lang="en-US" sz="1200" b="0" i="0" u="none" strike="noStrike" kern="1200" cap="none" spc="0" normalizeH="0" baseline="0" noProof="0" dirty="0" smtClean="0">
-                <a:ln>
-                  <a:noFill/>
-                </a:ln>
+              <a:rPr lang="en-IN" sz="1200" b="0" i="0" u="none" strike="noStrike" kern="1200" baseline="0" dirty="0" smtClean="0">
                 <a:solidFill>
-                  <a:prstClr val="black"/>
+                  <a:schemeClr val="tx1"/>
                 </a:solidFill>
-                <a:effectLst/>
-                <a:uLnTx/>
-                <a:uFillTx/>
                 <a:latin typeface="+mn-lt"/>
                 <a:ea typeface="+mn-ea"/>
                 <a:cs typeface="+mn-cs"/>
               </a:rPr>
-              <a:t>Share online: </a:t>
-            </a:r>
-            <a:r>
-              <a:rPr kumimoji="0" lang="en-US" sz="1200" b="1" i="0" u="none" strike="noStrike" kern="1200" cap="none" spc="0" normalizeH="0" baseline="0" noProof="0" dirty="0" smtClean="0">
-                <a:ln>
-                  <a:noFill/>
-                </a:ln>
+              <a:t>This bridge enables the hybrid app to take full advantage of all</a:t>
+            </a:r>
+          </a:p>
+          <a:p>
+            <a:r>
+              <a:rPr lang="en-IN" sz="1200" b="0" i="0" u="none" strike="noStrike" kern="1200" baseline="0" dirty="0" smtClean="0">
                 <a:solidFill>
-                  <a:prstClr val="black"/>
+                  <a:schemeClr val="tx1"/>
                 </a:solidFill>
-                <a:effectLst/>
-                <a:uLnTx/>
-                <a:uFillTx/>
                 <a:latin typeface="+mn-lt"/>
                 <a:ea typeface="+mn-ea"/>
                 <a:cs typeface="+mn-cs"/>
               </a:rPr>
-              <a:t>SlideOnline.com</a:t>
-            </a:r>
-            <a:r>
-              <a:rPr kumimoji="0" lang="en-US" sz="1200" b="0" i="0" u="none" strike="noStrike" kern="1200" cap="none" spc="0" normalizeH="0" baseline="0" noProof="0" dirty="0" smtClean="0">
-                <a:ln>
-                  <a:noFill/>
-                </a:ln>
+              <a:t>the features that modern devices have to offer.</a:t>
+            </a:r>
+            <a:endParaRPr lang="en-IN" dirty="0"/>
+          </a:p>
+        </p:txBody>
+      </p:sp>
+      <p:sp>
+        <p:nvSpPr>
+          <p:cNvPr id="4" name="Slide Number Placeholder 3"/>
+          <p:cNvSpPr>
+            <a:spLocks noGrp="1"/>
+          </p:cNvSpPr>
+          <p:nvPr>
+            <p:ph type="sldNum" sz="quarter" idx="10"/>
+          </p:nvPr>
+        </p:nvSpPr>
+        <p:spPr/>
+        <p:txBody>
+          <a:bodyPr/>
+          <a:lstStyle/>
+          <a:p>
+            <a:fld id="{36F078DE-0EAB-43EC-B0D5-FB8279C2ECBF}" type="slidenum">
+              <a:rPr lang="en-US" smtClean="0"/>
+              <a:pPr/>
+              <a:t>7</a:t>
+            </a:fld>
+            <a:endParaRPr lang="en-US" dirty="0"/>
+          </a:p>
+        </p:txBody>
+      </p:sp>
+    </p:spTree>
+    <p:extLst>
+      <p:ext uri="{BB962C8B-B14F-4D97-AF65-F5344CB8AC3E}">
+        <p14:creationId xmlns:p14="http://schemas.microsoft.com/office/powerpoint/2010/main" val="1541784359"/>
+      </p:ext>
+    </p:extLst>
+  </p:cSld>
+  <p:clrMapOvr>
+    <a:masterClrMapping/>
+  </p:clrMapOvr>
+</p:notes>
+</file>
+
+<file path=ppt/notesSlides/notesSlide6.xml><?xml version="1.0" encoding="utf-8"?>
+<p:notes xmlns:a="http://schemas.openxmlformats.org/drawingml/2006/main" xmlns:r="http://schemas.openxmlformats.org/officeDocument/2006/relationships" xmlns:p="http://schemas.openxmlformats.org/presentationml/2006/main">
+  <p:cSld>
+    <p:spTree>
+      <p:nvGrpSpPr>
+        <p:cNvPr id="1" name=""/>
+        <p:cNvGrpSpPr/>
+        <p:nvPr/>
+      </p:nvGrpSpPr>
+      <p:grpSpPr>
+        <a:xfrm>
+          <a:off x="0" y="0"/>
+          <a:ext cx="0" cy="0"/>
+          <a:chOff x="0" y="0"/>
+          <a:chExt cx="0" cy="0"/>
+        </a:xfrm>
+      </p:grpSpPr>
+      <p:sp>
+        <p:nvSpPr>
+          <p:cNvPr id="2" name="Slide Image Placeholder 1"/>
+          <p:cNvSpPr>
+            <a:spLocks noGrp="1" noRot="1" noChangeAspect="1"/>
+          </p:cNvSpPr>
+          <p:nvPr>
+            <p:ph type="sldImg"/>
+          </p:nvPr>
+        </p:nvSpPr>
+        <p:spPr/>
+      </p:sp>
+      <p:sp>
+        <p:nvSpPr>
+          <p:cNvPr id="3" name="Notes Placeholder 2"/>
+          <p:cNvSpPr>
+            <a:spLocks noGrp="1"/>
+          </p:cNvSpPr>
+          <p:nvPr>
+            <p:ph type="body" idx="1"/>
+          </p:nvPr>
+        </p:nvSpPr>
+        <p:spPr/>
+        <p:txBody>
+          <a:bodyPr/>
+          <a:lstStyle/>
+          <a:p>
+            <a:r>
+              <a:rPr lang="en-IN" dirty="0" smtClean="0"/>
+              <a:t>Explain from knowledge</a:t>
+            </a:r>
+            <a:r>
+              <a:rPr lang="en-IN" baseline="0" dirty="0" smtClean="0"/>
+              <a:t> of </a:t>
+            </a:r>
+            <a:r>
+              <a:rPr lang="en-IN" dirty="0" smtClean="0"/>
+              <a:t>previous slides notes</a:t>
+            </a:r>
+            <a:endParaRPr lang="en-IN" dirty="0"/>
+          </a:p>
+        </p:txBody>
+      </p:sp>
+      <p:sp>
+        <p:nvSpPr>
+          <p:cNvPr id="4" name="Slide Number Placeholder 3"/>
+          <p:cNvSpPr>
+            <a:spLocks noGrp="1"/>
+          </p:cNvSpPr>
+          <p:nvPr>
+            <p:ph type="sldNum" sz="quarter" idx="10"/>
+          </p:nvPr>
+        </p:nvSpPr>
+        <p:spPr/>
+        <p:txBody>
+          <a:bodyPr/>
+          <a:lstStyle/>
+          <a:p>
+            <a:fld id="{36F078DE-0EAB-43EC-B0D5-FB8279C2ECBF}" type="slidenum">
+              <a:rPr lang="en-US" smtClean="0"/>
+              <a:pPr/>
+              <a:t>8</a:t>
+            </a:fld>
+            <a:endParaRPr lang="en-US" dirty="0"/>
+          </a:p>
+        </p:txBody>
+      </p:sp>
+    </p:spTree>
+    <p:extLst>
+      <p:ext uri="{BB962C8B-B14F-4D97-AF65-F5344CB8AC3E}">
+        <p14:creationId xmlns:p14="http://schemas.microsoft.com/office/powerpoint/2010/main" val="1266294497"/>
+      </p:ext>
+    </p:extLst>
+  </p:cSld>
+  <p:clrMapOvr>
+    <a:masterClrMapping/>
+  </p:clrMapOvr>
+</p:notes>
+</file>
+
+<file path=ppt/notesSlides/notesSlide7.xml><?xml version="1.0" encoding="utf-8"?>
+<p:notes xmlns:a="http://schemas.openxmlformats.org/drawingml/2006/main" xmlns:r="http://schemas.openxmlformats.org/officeDocument/2006/relationships" xmlns:p="http://schemas.openxmlformats.org/presentationml/2006/main">
+  <p:cSld>
+    <p:spTree>
+      <p:nvGrpSpPr>
+        <p:cNvPr id="1" name=""/>
+        <p:cNvGrpSpPr/>
+        <p:nvPr/>
+      </p:nvGrpSpPr>
+      <p:grpSpPr>
+        <a:xfrm>
+          <a:off x="0" y="0"/>
+          <a:ext cx="0" cy="0"/>
+          <a:chOff x="0" y="0"/>
+          <a:chExt cx="0" cy="0"/>
+        </a:xfrm>
+      </p:grpSpPr>
+      <p:sp>
+        <p:nvSpPr>
+          <p:cNvPr id="2" name="Slide Image Placeholder 1"/>
+          <p:cNvSpPr>
+            <a:spLocks noGrp="1" noRot="1" noChangeAspect="1"/>
+          </p:cNvSpPr>
+          <p:nvPr>
+            <p:ph type="sldImg"/>
+          </p:nvPr>
+        </p:nvSpPr>
+        <p:spPr/>
+      </p:sp>
+      <p:sp>
+        <p:nvSpPr>
+          <p:cNvPr id="3" name="Notes Placeholder 2"/>
+          <p:cNvSpPr>
+            <a:spLocks noGrp="1"/>
+          </p:cNvSpPr>
+          <p:nvPr>
+            <p:ph type="body" idx="1"/>
+          </p:nvPr>
+        </p:nvSpPr>
+        <p:spPr/>
+        <p:txBody>
+          <a:bodyPr>
+            <a:normAutofit/>
+          </a:bodyPr>
+          <a:lstStyle/>
+          <a:p>
+            <a:pPr>
+              <a:buFont typeface="Arial" pitchFamily="34" charset="0"/>
+              <a:buChar char="•"/>
+            </a:pPr>
+            <a:r>
+              <a:rPr lang="en-US" sz="1200" kern="1200" baseline="0" dirty="0" smtClean="0">
                 <a:solidFill>
-                  <a:prstClr val="black"/>
+                  <a:schemeClr val="tx1"/>
                 </a:solidFill>
-                <a:effectLst/>
-                <a:uLnTx/>
-                <a:uFillTx/>
                 <a:latin typeface="+mn-lt"/>
                 <a:ea typeface="+mn-ea"/>
                 <a:cs typeface="+mn-cs"/>
               </a:rPr>
-              <a:t> lets you upload presentations for free.</a:t>
-            </a:r>
-          </a:p>
-          <a:p>
-            <a:pPr marL="0" marR="0" lvl="0" indent="0" algn="l" defTabSz="914400" rtl="0" eaLnBrk="1" fontAlgn="auto" latinLnBrk="0" hangingPunct="1">
-              <a:lnSpc>
-                <a:spcPct val="100000"/>
-              </a:lnSpc>
-              <a:spcBef>
-                <a:spcPts val="0"/>
-              </a:spcBef>
-              <a:spcAft>
-                <a:spcPts val="0"/>
-              </a:spcAft>
-              <a:buClrTx/>
-              <a:buSzTx/>
-              <a:buFontTx/>
-              <a:buNone/>
-              <a:tabLst/>
-              <a:defRPr/>
+              <a:t>The native portion of the application uses the operating system APIs to create an embedded HTML rendering engine that serves as a bridge between the browser and the device APIs.</a:t>
+            </a:r>
+          </a:p>
+          <a:p>
+            <a:pPr>
+              <a:buFont typeface="Arial" pitchFamily="34" charset="0"/>
+              <a:buChar char="•"/>
             </a:pPr>
-            <a:endParaRPr kumimoji="0" lang="en-US" sz="1200" b="0" i="0" u="none" strike="noStrike" kern="1200" cap="none" spc="0" normalizeH="0" baseline="0" noProof="0" dirty="0" smtClean="0">
-              <a:ln>
-                <a:noFill/>
-              </a:ln>
-              <a:solidFill>
-                <a:prstClr val="black"/>
-              </a:solidFill>
-              <a:effectLst/>
-              <a:uLnTx/>
-              <a:uFillTx/>
-              <a:latin typeface="+mn-lt"/>
-              <a:ea typeface="+mn-ea"/>
-              <a:cs typeface="+mn-cs"/>
-            </a:endParaRPr>
-          </a:p>
+            <a:r>
+              <a:rPr lang="en-US" sz="1200" kern="1200" baseline="0" dirty="0" smtClean="0">
+                <a:solidFill>
+                  <a:schemeClr val="tx1"/>
+                </a:solidFill>
+                <a:latin typeface="+mn-lt"/>
+                <a:ea typeface="+mn-ea"/>
+                <a:cs typeface="+mn-cs"/>
+              </a:rPr>
+              <a:t>This bridge enables the hybrid app to take full advantage of all the features that modern devices have to offer.</a:t>
+            </a:r>
+            <a:endParaRPr lang="en-US" dirty="0"/>
+          </a:p>
+        </p:txBody>
+      </p:sp>
+      <p:sp>
+        <p:nvSpPr>
+          <p:cNvPr id="4" name="Slide Number Placeholder 3"/>
+          <p:cNvSpPr>
+            <a:spLocks noGrp="1"/>
+          </p:cNvSpPr>
+          <p:nvPr>
+            <p:ph type="sldNum" sz="quarter" idx="10"/>
+          </p:nvPr>
+        </p:nvSpPr>
+        <p:spPr/>
+        <p:txBody>
+          <a:bodyPr/>
+          <a:lstStyle/>
+          <a:p>
+            <a:fld id="{36F078DE-0EAB-43EC-B0D5-FB8279C2ECBF}" type="slidenum">
+              <a:rPr lang="en-US" smtClean="0"/>
+              <a:pPr/>
+              <a:t>9</a:t>
+            </a:fld>
+            <a:endParaRPr lang="en-US" dirty="0"/>
+          </a:p>
+        </p:txBody>
+      </p:sp>
+    </p:spTree>
+    <p:extLst>
+      <p:ext uri="{BB962C8B-B14F-4D97-AF65-F5344CB8AC3E}">
+        <p14:creationId xmlns:p14="http://schemas.microsoft.com/office/powerpoint/2010/main" val="3917493518"/>
+      </p:ext>
+    </p:extLst>
+  </p:cSld>
+  <p:clrMapOvr>
+    <a:masterClrMapping/>
+  </p:clrMapOvr>
+</p:notes>
+</file>
+
+<file path=ppt/notesSlides/notesSlide8.xml><?xml version="1.0" encoding="utf-8"?>
+<p:notes xmlns:a="http://schemas.openxmlformats.org/drawingml/2006/main" xmlns:r="http://schemas.openxmlformats.org/officeDocument/2006/relationships" xmlns:p="http://schemas.openxmlformats.org/presentationml/2006/main">
+  <p:cSld>
+    <p:spTree>
+      <p:nvGrpSpPr>
+        <p:cNvPr id="1" name=""/>
+        <p:cNvGrpSpPr/>
+        <p:nvPr/>
+      </p:nvGrpSpPr>
+      <p:grpSpPr>
+        <a:xfrm>
+          <a:off x="0" y="0"/>
+          <a:ext cx="0" cy="0"/>
+          <a:chOff x="0" y="0"/>
+          <a:chExt cx="0" cy="0"/>
+        </a:xfrm>
+      </p:grpSpPr>
+      <p:sp>
+        <p:nvSpPr>
+          <p:cNvPr id="2" name="Slide Image Placeholder 1"/>
+          <p:cNvSpPr>
+            <a:spLocks noGrp="1" noRot="1" noChangeAspect="1"/>
+          </p:cNvSpPr>
+          <p:nvPr>
+            <p:ph type="sldImg"/>
+          </p:nvPr>
+        </p:nvSpPr>
+        <p:spPr/>
+      </p:sp>
+      <p:sp>
+        <p:nvSpPr>
+          <p:cNvPr id="3" name="Notes Placeholder 2"/>
+          <p:cNvSpPr>
+            <a:spLocks noGrp="1"/>
+          </p:cNvSpPr>
+          <p:nvPr>
+            <p:ph type="body" idx="1"/>
+          </p:nvPr>
+        </p:nvSpPr>
+        <p:spPr/>
+        <p:txBody>
+          <a:bodyPr/>
+          <a:lstStyle/>
           <a:p>
             <a:endParaRPr lang="en-US" dirty="0"/>
           </a:p>
@@ -6016,7 +6604,7 @@
                 </a:solidFill>
               </a:rPr>
               <a:pPr/>
-              <a:t>22</a:t>
+              <a:t>23</a:t>
             </a:fld>
             <a:endParaRPr lang="en-US" dirty="0">
               <a:solidFill>
@@ -12538,12 +13126,12 @@
           <a:graphicData uri="http://schemas.openxmlformats.org/presentationml/2006/ole">
             <mc:AlternateContent xmlns:mc="http://schemas.openxmlformats.org/markup-compatibility/2006">
               <mc:Choice xmlns:v="urn:schemas-microsoft-com:vml" Requires="v">
-                <p:oleObj spid="_x0000_s11307" name="think-cell Slide" r:id="rId4" imgW="360" imgH="360" progId="">
+                <p:oleObj spid="_x0000_s11314" name="think-cell Slide" r:id="rId5" imgW="360" imgH="360" progId="">
                   <p:embed/>
                 </p:oleObj>
               </mc:Choice>
               <mc:Fallback>
-                <p:oleObj name="think-cell Slide" r:id="rId4" imgW="360" imgH="360" progId="">
+                <p:oleObj name="think-cell Slide" r:id="rId5" imgW="360" imgH="360" progId="">
                   <p:embed/>
                   <p:pic>
                     <p:nvPicPr>
@@ -12554,7 +13142,7 @@
                       <p:nvPr/>
                     </p:nvPicPr>
                     <p:blipFill>
-                      <a:blip r:embed="rId5">
+                      <a:blip r:embed="rId6">
                         <a:extLst>
                           <a:ext uri="{28A0092B-C50C-407E-A947-70E740481C1C}">
                             <a14:useLocalDpi xmlns:a14="http://schemas.microsoft.com/office/drawing/2010/main" val="0"/>
@@ -12675,7 +13263,7 @@
         </p:xfrm>
         <a:graphic>
           <a:graphicData uri="http://schemas.openxmlformats.org/drawingml/2006/diagram">
-            <dgm:relIds xmlns:dgm="http://schemas.openxmlformats.org/drawingml/2006/diagram" xmlns:r="http://schemas.openxmlformats.org/officeDocument/2006/relationships" r:dm="rId6" r:lo="rId7" r:qs="rId8" r:cs="rId9"/>
+            <dgm:relIds xmlns:dgm="http://schemas.openxmlformats.org/drawingml/2006/diagram" xmlns:r="http://schemas.openxmlformats.org/officeDocument/2006/relationships" r:dm="rId7" r:lo="rId8" r:qs="rId9" r:cs="rId10"/>
           </a:graphicData>
         </a:graphic>
       </p:graphicFrame>
@@ -12808,6 +13396,88 @@
           <a:chExt cx="0" cy="0"/>
         </a:xfrm>
       </p:grpSpPr>
+      <p:sp>
+        <p:nvSpPr>
+          <p:cNvPr id="2" name="Title 1"/>
+          <p:cNvSpPr>
+            <a:spLocks noGrp="1"/>
+          </p:cNvSpPr>
+          <p:nvPr>
+            <p:ph type="title"/>
+          </p:nvPr>
+        </p:nvSpPr>
+        <p:spPr/>
+        <p:txBody>
+          <a:bodyPr/>
+          <a:lstStyle/>
+          <a:p>
+            <a:pPr algn="ctr"/>
+            <a:r>
+              <a:rPr lang="en-US" dirty="0" smtClean="0"/>
+              <a:t>Architecture of Hybrid Apps</a:t>
+            </a:r>
+            <a:endParaRPr lang="en-US" dirty="0"/>
+          </a:p>
+        </p:txBody>
+      </p:sp>
+      <p:pic>
+        <p:nvPicPr>
+          <p:cNvPr id="49153" name="Picture 1" descr="G:\cpmd_hybridapps.png"/>
+          <p:cNvPicPr>
+            <a:picLocks noChangeAspect="1" noChangeArrowheads="1"/>
+          </p:cNvPicPr>
+          <p:nvPr/>
+        </p:nvPicPr>
+        <p:blipFill>
+          <a:blip r:embed="rId2"/>
+          <a:srcRect/>
+          <a:stretch>
+            <a:fillRect/>
+          </a:stretch>
+        </p:blipFill>
+        <p:spPr bwMode="auto">
+          <a:xfrm>
+            <a:off x="423863" y="1336221"/>
+            <a:ext cx="8296275" cy="4838700"/>
+          </a:xfrm>
+          <a:prstGeom prst="rect">
+            <a:avLst/>
+          </a:prstGeom>
+          <a:noFill/>
+        </p:spPr>
+      </p:pic>
+    </p:spTree>
+  </p:cSld>
+  <p:clrMapOvr>
+    <a:masterClrMapping/>
+  </p:clrMapOvr>
+  <p:timing>
+    <p:tnLst>
+      <p:par>
+        <p:cTn id="1" dur="indefinite" restart="never" nodeType="tmRoot"/>
+      </p:par>
+    </p:tnLst>
+  </p:timing>
+</p:sld>
+</file>
+
+<file path=ppt/slides/slide11.xml><?xml version="1.0" encoding="utf-8"?>
+<p:sld xmlns:a="http://schemas.openxmlformats.org/drawingml/2006/main" xmlns:r="http://schemas.openxmlformats.org/officeDocument/2006/relationships" xmlns:p="http://schemas.openxmlformats.org/presentationml/2006/main">
+  <p:cSld>
+    <p:spTree>
+      <p:nvGrpSpPr>
+        <p:cNvPr id="1" name=""/>
+        <p:cNvGrpSpPr/>
+        <p:nvPr/>
+      </p:nvGrpSpPr>
+      <p:grpSpPr>
+        <a:xfrm>
+          <a:off x="0" y="0"/>
+          <a:ext cx="0" cy="0"/>
+          <a:chOff x="0" y="0"/>
+          <a:chExt cx="0" cy="0"/>
+        </a:xfrm>
+      </p:grpSpPr>
       <p:graphicFrame>
         <p:nvGraphicFramePr>
           <p:cNvPr id="65" name="Object 64" hidden="1"/>
@@ -12833,7 +13503,7 @@
           <a:graphicData uri="http://schemas.openxmlformats.org/presentationml/2006/ole">
             <mc:AlternateContent xmlns:mc="http://schemas.openxmlformats.org/markup-compatibility/2006">
               <mc:Choice xmlns:v="urn:schemas-microsoft-com:vml" Requires="v">
-                <p:oleObj spid="_x0000_s19460" name="think-cell Slide" r:id="rId4" imgW="360" imgH="360" progId="">
+                <p:oleObj spid="_x0000_s19467" name="think-cell Slide" r:id="rId4" imgW="360" imgH="360" progId="">
                   <p:embed/>
                 </p:oleObj>
               </mc:Choice>
@@ -12956,7 +13626,7 @@
 </p:sld>
 </file>
 
-<file path=ppt/slides/slide11.xml><?xml version="1.0" encoding="utf-8"?>
+<file path=ppt/slides/slide12.xml><?xml version="1.0" encoding="utf-8"?>
 <p:sld xmlns:a="http://schemas.openxmlformats.org/drawingml/2006/main" xmlns:r="http://schemas.openxmlformats.org/officeDocument/2006/relationships" xmlns:p="http://schemas.openxmlformats.org/presentationml/2006/main">
   <p:cSld>
     <p:spTree>
@@ -12988,8 +13658,8 @@
         </p:blipFill>
         <p:spPr bwMode="auto">
           <a:xfrm>
-            <a:off x="360608" y="1339402"/>
-            <a:ext cx="8461420" cy="4468969"/>
+            <a:off x="360608" y="1339403"/>
+            <a:ext cx="8461420" cy="4045398"/>
           </a:xfrm>
           <a:prstGeom prst="rect">
             <a:avLst/>
@@ -13019,7 +13689,7 @@
 </p:sld>
 </file>
 
-<file path=ppt/slides/slide12.xml><?xml version="1.0" encoding="utf-8"?>
+<file path=ppt/slides/slide13.xml><?xml version="1.0" encoding="utf-8"?>
 <p:sld xmlns:a="http://schemas.openxmlformats.org/drawingml/2006/main" xmlns:r="http://schemas.openxmlformats.org/officeDocument/2006/relationships" xmlns:p="http://schemas.openxmlformats.org/presentationml/2006/main">
   <p:cSld>
     <p:spTree>
@@ -13061,7 +13731,7 @@
           <a:graphicData uri="http://schemas.openxmlformats.org/presentationml/2006/ole">
             <mc:AlternateContent xmlns:mc="http://schemas.openxmlformats.org/markup-compatibility/2006">
               <mc:Choice xmlns:v="urn:schemas-microsoft-com:vml" Requires="v">
-                <p:oleObj spid="_x0000_s18436" name="think-cell Slide" r:id="rId4" imgW="360" imgH="360" progId="">
+                <p:oleObj spid="_x0000_s18443" name="think-cell Slide" r:id="rId4" imgW="360" imgH="360" progId="">
                   <p:embed/>
                 </p:oleObj>
               </mc:Choice>
@@ -13187,7 +13857,7 @@
 </p:sld>
 </file>
 
-<file path=ppt/slides/slide13.xml><?xml version="1.0" encoding="utf-8"?>
+<file path=ppt/slides/slide14.xml><?xml version="1.0" encoding="utf-8"?>
 <p:sld xmlns:a="http://schemas.openxmlformats.org/drawingml/2006/main" xmlns:r="http://schemas.openxmlformats.org/officeDocument/2006/relationships" xmlns:p="http://schemas.openxmlformats.org/presentationml/2006/main">
   <p:cSld>
     <p:spTree>
@@ -13229,7 +13899,7 @@
           <a:graphicData uri="http://schemas.openxmlformats.org/presentationml/2006/ole">
             <mc:AlternateContent xmlns:mc="http://schemas.openxmlformats.org/markup-compatibility/2006">
               <mc:Choice xmlns:v="urn:schemas-microsoft-com:vml" Requires="v">
-                <p:oleObj spid="_x0000_s22533" name="think-cell Slide" r:id="rId4" imgW="360" imgH="360" progId="">
+                <p:oleObj spid="_x0000_s22540" name="think-cell Slide" r:id="rId4" imgW="360" imgH="360" progId="">
                   <p:embed/>
                 </p:oleObj>
               </mc:Choice>
@@ -13481,7 +14151,7 @@
 </p:sld>
 </file>
 
-<file path=ppt/slides/slide14.xml><?xml version="1.0" encoding="utf-8"?>
+<file path=ppt/slides/slide15.xml><?xml version="1.0" encoding="utf-8"?>
 <p:sld xmlns:a="http://schemas.openxmlformats.org/drawingml/2006/main" xmlns:r="http://schemas.openxmlformats.org/officeDocument/2006/relationships" xmlns:p="http://schemas.openxmlformats.org/presentationml/2006/main">
   <p:cSld>
     <p:spTree>
@@ -13523,7 +14193,7 @@
           <a:graphicData uri="http://schemas.openxmlformats.org/presentationml/2006/ole">
             <mc:AlternateContent xmlns:mc="http://schemas.openxmlformats.org/markup-compatibility/2006">
               <mc:Choice xmlns:v="urn:schemas-microsoft-com:vml" Requires="v">
-                <p:oleObj spid="_x0000_s20484" name="think-cell Slide" r:id="rId4" imgW="360" imgH="360" progId="">
+                <p:oleObj spid="_x0000_s20491" name="think-cell Slide" r:id="rId4" imgW="360" imgH="360" progId="">
                   <p:embed/>
                 </p:oleObj>
               </mc:Choice>
@@ -13646,7 +14316,7 @@
 </p:sld>
 </file>
 
-<file path=ppt/slides/slide15.xml><?xml version="1.0" encoding="utf-8"?>
+<file path=ppt/slides/slide16.xml><?xml version="1.0" encoding="utf-8"?>
 <p:sld xmlns:a="http://schemas.openxmlformats.org/drawingml/2006/main" xmlns:r="http://schemas.openxmlformats.org/officeDocument/2006/relationships" xmlns:p="http://schemas.openxmlformats.org/presentationml/2006/main">
   <p:cSld>
     <p:spTree>
@@ -13688,7 +14358,7 @@
           <a:graphicData uri="http://schemas.openxmlformats.org/presentationml/2006/ole">
             <mc:AlternateContent xmlns:mc="http://schemas.openxmlformats.org/markup-compatibility/2006">
               <mc:Choice xmlns:v="urn:schemas-microsoft-com:vml" Requires="v">
-                <p:oleObj spid="_x0000_s17418" name="think-cell Slide" r:id="rId4" imgW="360" imgH="360" progId="">
+                <p:oleObj spid="_x0000_s17425" name="think-cell Slide" r:id="rId4" imgW="360" imgH="360" progId="">
                   <p:embed/>
                 </p:oleObj>
               </mc:Choice>
@@ -13839,7 +14509,7 @@
 </p:sld>
 </file>
 
-<file path=ppt/slides/slide16.xml><?xml version="1.0" encoding="utf-8"?>
+<file path=ppt/slides/slide17.xml><?xml version="1.0" encoding="utf-8"?>
 <p:sld xmlns:a="http://schemas.openxmlformats.org/drawingml/2006/main" xmlns:r="http://schemas.openxmlformats.org/officeDocument/2006/relationships" xmlns:p="http://schemas.openxmlformats.org/presentationml/2006/main">
   <p:cSld>
     <p:spTree>
@@ -13881,7 +14551,7 @@
           <a:graphicData uri="http://schemas.openxmlformats.org/presentationml/2006/ole">
             <mc:AlternateContent xmlns:mc="http://schemas.openxmlformats.org/markup-compatibility/2006">
               <mc:Choice xmlns:v="urn:schemas-microsoft-com:vml" Requires="v">
-                <p:oleObj spid="_x0000_s21509" name="think-cell Slide" r:id="rId4" imgW="360" imgH="360" progId="">
+                <p:oleObj spid="_x0000_s21516" name="think-cell Slide" r:id="rId4" imgW="360" imgH="360" progId="">
                   <p:embed/>
                 </p:oleObj>
               </mc:Choice>
@@ -13998,7 +14668,7 @@
 </p:sld>
 </file>
 
-<file path=ppt/slides/slide17.xml><?xml version="1.0" encoding="utf-8"?>
+<file path=ppt/slides/slide18.xml><?xml version="1.0" encoding="utf-8"?>
 <p:sld xmlns:a="http://schemas.openxmlformats.org/drawingml/2006/main" xmlns:r="http://schemas.openxmlformats.org/officeDocument/2006/relationships" xmlns:p="http://schemas.openxmlformats.org/presentationml/2006/main">
   <p:cSld>
     <p:spTree>
@@ -14040,7 +14710,7 @@
           <a:graphicData uri="http://schemas.openxmlformats.org/presentationml/2006/ole">
             <mc:AlternateContent xmlns:mc="http://schemas.openxmlformats.org/markup-compatibility/2006">
               <mc:Choice xmlns:v="urn:schemas-microsoft-com:vml" Requires="v">
-                <p:oleObj spid="_x0000_s23556" name="think-cell Slide" r:id="rId4" imgW="360" imgH="360" progId="">
+                <p:oleObj spid="_x0000_s23563" name="think-cell Slide" r:id="rId4" imgW="360" imgH="360" progId="">
                   <p:embed/>
                 </p:oleObj>
               </mc:Choice>
@@ -14156,7 +14826,7 @@
 </p:sld>
 </file>
 
-<file path=ppt/slides/slide18.xml><?xml version="1.0" encoding="utf-8"?>
+<file path=ppt/slides/slide19.xml><?xml version="1.0" encoding="utf-8"?>
 <p:sld xmlns:a="http://schemas.openxmlformats.org/drawingml/2006/main" xmlns:r="http://schemas.openxmlformats.org/officeDocument/2006/relationships" xmlns:p="http://schemas.openxmlformats.org/presentationml/2006/main">
   <p:cSld>
     <p:spTree>
@@ -14198,7 +14868,7 @@
           <a:graphicData uri="http://schemas.openxmlformats.org/presentationml/2006/ole">
             <mc:AlternateContent xmlns:mc="http://schemas.openxmlformats.org/markup-compatibility/2006">
               <mc:Choice xmlns:v="urn:schemas-microsoft-com:vml" Requires="v">
-                <p:oleObj spid="_x0000_s24579" name="think-cell Slide" r:id="rId4" imgW="360" imgH="360" progId="">
+                <p:oleObj spid="_x0000_s24586" name="think-cell Slide" r:id="rId4" imgW="360" imgH="360" progId="">
                   <p:embed/>
                 </p:oleObj>
               </mc:Choice>
@@ -14314,7 +14984,84 @@
 </p:sld>
 </file>
 
-<file path=ppt/slides/slide19.xml><?xml version="1.0" encoding="utf-8"?>
+<file path=ppt/slides/slide2.xml><?xml version="1.0" encoding="utf-8"?>
+<p:sld xmlns:a="http://schemas.openxmlformats.org/drawingml/2006/main" xmlns:r="http://schemas.openxmlformats.org/officeDocument/2006/relationships" xmlns:p="http://schemas.openxmlformats.org/presentationml/2006/main">
+  <p:cSld>
+    <p:spTree>
+      <p:nvGrpSpPr>
+        <p:cNvPr id="1" name=""/>
+        <p:cNvGrpSpPr/>
+        <p:nvPr/>
+      </p:nvGrpSpPr>
+      <p:grpSpPr>
+        <a:xfrm>
+          <a:off x="0" y="0"/>
+          <a:ext cx="0" cy="0"/>
+          <a:chOff x="0" y="0"/>
+          <a:chExt cx="0" cy="0"/>
+        </a:xfrm>
+      </p:grpSpPr>
+      <p:sp>
+        <p:nvSpPr>
+          <p:cNvPr id="2" name="Title 1"/>
+          <p:cNvSpPr>
+            <a:spLocks noGrp="1"/>
+          </p:cNvSpPr>
+          <p:nvPr>
+            <p:ph type="title"/>
+          </p:nvPr>
+        </p:nvSpPr>
+        <p:spPr>
+          <a:xfrm>
+            <a:off x="560231" y="2901929"/>
+            <a:ext cx="8229600" cy="715962"/>
+          </a:xfrm>
+        </p:spPr>
+        <p:txBody>
+          <a:bodyPr/>
+          <a:lstStyle/>
+          <a:p>
+            <a:r>
+              <a:rPr lang="en-IN" dirty="0" smtClean="0">
+                <a:solidFill>
+                  <a:srgbClr val="002060"/>
+                </a:solidFill>
+                <a:latin typeface="Adobe Gothic Std B" panose="020B0800000000000000" pitchFamily="34" charset="-128"/>
+                <a:ea typeface="Adobe Gothic Std B" panose="020B0800000000000000" pitchFamily="34" charset="-128"/>
+              </a:rPr>
+              <a:t>Mobile Application Development</a:t>
+            </a:r>
+            <a:endParaRPr lang="en-IN" dirty="0">
+              <a:solidFill>
+                <a:srgbClr val="002060"/>
+              </a:solidFill>
+              <a:latin typeface="Adobe Gothic Std B" panose="020B0800000000000000" pitchFamily="34" charset="-128"/>
+              <a:ea typeface="Adobe Gothic Std B" panose="020B0800000000000000" pitchFamily="34" charset="-128"/>
+            </a:endParaRPr>
+          </a:p>
+        </p:txBody>
+      </p:sp>
+    </p:spTree>
+    <p:extLst>
+      <p:ext uri="{BB962C8B-B14F-4D97-AF65-F5344CB8AC3E}">
+        <p14:creationId xmlns:p14="http://schemas.microsoft.com/office/powerpoint/2010/main" val="2506622196"/>
+      </p:ext>
+    </p:extLst>
+  </p:cSld>
+  <p:clrMapOvr>
+    <a:masterClrMapping/>
+  </p:clrMapOvr>
+  <p:timing>
+    <p:tnLst>
+      <p:par>
+        <p:cTn id="1" dur="indefinite" restart="never" nodeType="tmRoot"/>
+      </p:par>
+    </p:tnLst>
+  </p:timing>
+</p:sld>
+</file>
+
+<file path=ppt/slides/slide20.xml><?xml version="1.0" encoding="utf-8"?>
 <p:sld xmlns:a="http://schemas.openxmlformats.org/drawingml/2006/main" xmlns:r="http://schemas.openxmlformats.org/officeDocument/2006/relationships" xmlns:p="http://schemas.openxmlformats.org/presentationml/2006/main">
   <p:cSld>
     <p:spTree>
@@ -14356,7 +15103,7 @@
           <a:graphicData uri="http://schemas.openxmlformats.org/presentationml/2006/ole">
             <mc:AlternateContent xmlns:mc="http://schemas.openxmlformats.org/markup-compatibility/2006">
               <mc:Choice xmlns:v="urn:schemas-microsoft-com:vml" Requires="v">
-                <p:oleObj spid="_x0000_s25603" name="think-cell Slide" r:id="rId4" imgW="360" imgH="360" progId="">
+                <p:oleObj spid="_x0000_s25610" name="think-cell Slide" r:id="rId4" imgW="360" imgH="360" progId="">
                   <p:embed/>
                 </p:oleObj>
               </mc:Choice>
@@ -14472,77 +15219,7 @@
 </p:sld>
 </file>
 
-<file path=ppt/slides/slide2.xml><?xml version="1.0" encoding="utf-8"?>
-<p:sld xmlns:a="http://schemas.openxmlformats.org/drawingml/2006/main" xmlns:r="http://schemas.openxmlformats.org/officeDocument/2006/relationships" xmlns:p="http://schemas.openxmlformats.org/presentationml/2006/main">
-  <p:cSld>
-    <p:spTree>
-      <p:nvGrpSpPr>
-        <p:cNvPr id="1" name=""/>
-        <p:cNvGrpSpPr/>
-        <p:nvPr/>
-      </p:nvGrpSpPr>
-      <p:grpSpPr>
-        <a:xfrm>
-          <a:off x="0" y="0"/>
-          <a:ext cx="0" cy="0"/>
-          <a:chOff x="0" y="0"/>
-          <a:chExt cx="0" cy="0"/>
-        </a:xfrm>
-      </p:grpSpPr>
-      <p:sp>
-        <p:nvSpPr>
-          <p:cNvPr id="2" name="Title 1"/>
-          <p:cNvSpPr>
-            <a:spLocks noGrp="1"/>
-          </p:cNvSpPr>
-          <p:nvPr>
-            <p:ph type="title"/>
-          </p:nvPr>
-        </p:nvSpPr>
-        <p:spPr>
-          <a:xfrm>
-            <a:off x="560231" y="2901929"/>
-            <a:ext cx="8229600" cy="715962"/>
-          </a:xfrm>
-        </p:spPr>
-        <p:txBody>
-          <a:bodyPr/>
-          <a:lstStyle/>
-          <a:p>
-            <a:r>
-              <a:rPr lang="en-IN" dirty="0" smtClean="0">
-                <a:solidFill>
-                  <a:srgbClr val="002060"/>
-                </a:solidFill>
-                <a:latin typeface="Adobe Gothic Std B" panose="020B0800000000000000" pitchFamily="34" charset="-128"/>
-                <a:ea typeface="Adobe Gothic Std B" panose="020B0800000000000000" pitchFamily="34" charset="-128"/>
-              </a:rPr>
-              <a:t>Mobile Application Development</a:t>
-            </a:r>
-            <a:endParaRPr lang="en-IN" dirty="0">
-              <a:solidFill>
-                <a:srgbClr val="002060"/>
-              </a:solidFill>
-              <a:latin typeface="Adobe Gothic Std B" panose="020B0800000000000000" pitchFamily="34" charset="-128"/>
-              <a:ea typeface="Adobe Gothic Std B" panose="020B0800000000000000" pitchFamily="34" charset="-128"/>
-            </a:endParaRPr>
-          </a:p>
-        </p:txBody>
-      </p:sp>
-    </p:spTree>
-    <p:extLst>
-      <p:ext uri="{BB962C8B-B14F-4D97-AF65-F5344CB8AC3E}">
-        <p14:creationId xmlns:p14="http://schemas.microsoft.com/office/powerpoint/2010/main" val="2506622196"/>
-      </p:ext>
-    </p:extLst>
-  </p:cSld>
-  <p:clrMapOvr>
-    <a:masterClrMapping/>
-  </p:clrMapOvr>
-</p:sld>
-</file>
-
-<file path=ppt/slides/slide20.xml><?xml version="1.0" encoding="utf-8"?>
+<file path=ppt/slides/slide21.xml><?xml version="1.0" encoding="utf-8"?>
 <p:sld xmlns:a="http://schemas.openxmlformats.org/drawingml/2006/main" xmlns:r="http://schemas.openxmlformats.org/officeDocument/2006/relationships" xmlns:p="http://schemas.openxmlformats.org/presentationml/2006/main">
   <p:cSld>
     <p:spTree>
@@ -14621,7 +15298,7 @@
 </p:sld>
 </file>
 
-<file path=ppt/slides/slide21.xml><?xml version="1.0" encoding="utf-8"?>
+<file path=ppt/slides/slide22.xml><?xml version="1.0" encoding="utf-8"?>
 <p:sld xmlns:a="http://schemas.openxmlformats.org/drawingml/2006/main" xmlns:r="http://schemas.openxmlformats.org/officeDocument/2006/relationships" xmlns:p="http://schemas.openxmlformats.org/presentationml/2006/main">
   <p:cSld>
     <p:spTree>
@@ -14700,7 +15377,7 @@
 </p:sld>
 </file>
 
-<file path=ppt/slides/slide22.xml><?xml version="1.0" encoding="utf-8"?>
+<file path=ppt/slides/slide23.xml><?xml version="1.0" encoding="utf-8"?>
 <p:sld xmlns:a="http://schemas.openxmlformats.org/drawingml/2006/main" xmlns:r="http://schemas.openxmlformats.org/officeDocument/2006/relationships" xmlns:p="http://schemas.openxmlformats.org/presentationml/2006/main">
   <p:cSld>
     <p:bg>
@@ -14847,7 +15524,7 @@
           <a:graphicData uri="http://schemas.openxmlformats.org/presentationml/2006/ole">
             <mc:AlternateContent xmlns:mc="http://schemas.openxmlformats.org/markup-compatibility/2006">
               <mc:Choice xmlns:v="urn:schemas-microsoft-com:vml" Requires="v">
-                <p:oleObj spid="_x0000_s48131" name="think-cell Slide" r:id="rId5" imgW="360" imgH="360" progId="">
+                <p:oleObj spid="_x0000_s48139" name="think-cell Slide" r:id="rId5" imgW="360" imgH="360" progId="">
                   <p:embed/>
                 </p:oleObj>
               </mc:Choice>
@@ -15592,7 +16269,7 @@
           <p:nvPr/>
         </p:nvPicPr>
         <p:blipFill>
-          <a:blip r:embed="rId2"/>
+          <a:blip r:embed="rId3"/>
           <a:srcRect/>
           <a:stretch>
             <a:fillRect/>
@@ -15656,104 +16333,46 @@
           <a:bodyPr/>
           <a:lstStyle/>
           <a:p>
-            <a:pPr algn="ctr"/>
-            <a:r>
-              <a:rPr lang="en-US" dirty="0" smtClean="0"/>
-              <a:t>Overview</a:t>
-            </a:r>
-            <a:endParaRPr lang="en-US" dirty="0"/>
-          </a:p>
-        </p:txBody>
-      </p:sp>
-      <p:sp>
-        <p:nvSpPr>
-          <p:cNvPr id="3" name="TextBox 2"/>
-          <p:cNvSpPr txBox="1"/>
+            <a:endParaRPr lang="en-IN"/>
+          </a:p>
+        </p:txBody>
+      </p:sp>
+      <p:pic>
+        <p:nvPicPr>
+          <p:cNvPr id="3" name="Picture 2"/>
+          <p:cNvPicPr>
+            <a:picLocks noChangeAspect="1"/>
+          </p:cNvPicPr>
           <p:nvPr/>
-        </p:nvSpPr>
+        </p:nvPicPr>
+        <p:blipFill>
+          <a:blip r:embed="rId3">
+            <a:extLst>
+              <a:ext uri="{28A0092B-C50C-407E-A947-70E740481C1C}">
+                <a14:useLocalDpi xmlns:a14="http://schemas.microsoft.com/office/drawing/2010/main" val="0"/>
+              </a:ext>
+            </a:extLst>
+          </a:blip>
+          <a:stretch>
+            <a:fillRect/>
+          </a:stretch>
+        </p:blipFill>
         <p:spPr>
           <a:xfrm>
-            <a:off x="457200" y="1519084"/>
-            <a:ext cx="8229600" cy="4093428"/>
+            <a:off x="530157" y="1693333"/>
+            <a:ext cx="8083685" cy="4114800"/>
           </a:xfrm>
           <a:prstGeom prst="rect">
             <a:avLst/>
           </a:prstGeom>
-          <a:noFill/>
         </p:spPr>
-        <p:txBody>
-          <a:bodyPr wrap="square" rtlCol="0">
-            <a:spAutoFit/>
-          </a:bodyPr>
-          <a:lstStyle/>
-          <a:p>
-            <a:pPr>
-              <a:buFont typeface="Arial" pitchFamily="34" charset="0"/>
-              <a:buChar char="•"/>
-            </a:pPr>
-            <a:r>
-              <a:rPr lang="en-US" sz="2000" dirty="0" smtClean="0"/>
-              <a:t>The hybrid approach combines native development with web</a:t>
-            </a:r>
-          </a:p>
-          <a:p>
-            <a:r>
-              <a:rPr lang="en-US" sz="2000" dirty="0" smtClean="0"/>
-              <a:t>technology.</a:t>
-            </a:r>
-          </a:p>
-          <a:p>
-            <a:pPr>
-              <a:buFont typeface="Arial" pitchFamily="34" charset="0"/>
-              <a:buChar char="•"/>
-            </a:pPr>
-            <a:endParaRPr lang="en-US" sz="2000" dirty="0" smtClean="0"/>
-          </a:p>
-          <a:p>
-            <a:pPr>
-              <a:buFont typeface="Arial" pitchFamily="34" charset="0"/>
-              <a:buChar char="•"/>
-            </a:pPr>
-            <a:r>
-              <a:rPr lang="en-US" sz="2000" dirty="0" smtClean="0"/>
-              <a:t>Developers write significant portions of their application in cross-platform web technologies, while maintaining direct access to native APIs when required.</a:t>
-            </a:r>
-          </a:p>
-          <a:p>
-            <a:pPr>
-              <a:buFont typeface="Arial" pitchFamily="34" charset="0"/>
-              <a:buChar char="•"/>
-            </a:pPr>
-            <a:endParaRPr lang="en-US" sz="2000" dirty="0" smtClean="0"/>
-          </a:p>
-          <a:p>
-            <a:pPr>
-              <a:buFont typeface="Arial" pitchFamily="34" charset="0"/>
-              <a:buChar char="•"/>
-            </a:pPr>
-            <a:r>
-              <a:rPr lang="en-US" sz="2000" dirty="0" smtClean="0"/>
-              <a:t>The native portion of the app can be developed independently, whereas the web portion of the app can be either a web page that resides</a:t>
-            </a:r>
-          </a:p>
-          <a:p>
-            <a:r>
-              <a:rPr lang="en-US" sz="2000" dirty="0" smtClean="0"/>
-              <a:t>on a server.</a:t>
-            </a:r>
-          </a:p>
-          <a:p>
-            <a:endParaRPr lang="en-US" sz="2000" dirty="0" smtClean="0"/>
-          </a:p>
-          <a:p>
-            <a:endParaRPr lang="en-US" sz="2000" dirty="0" smtClean="0"/>
-          </a:p>
-          <a:p>
-            <a:endParaRPr lang="en-US" sz="2000" dirty="0"/>
-          </a:p>
-        </p:txBody>
-      </p:sp>
+      </p:pic>
     </p:spTree>
+    <p:extLst>
+      <p:ext uri="{BB962C8B-B14F-4D97-AF65-F5344CB8AC3E}">
+        <p14:creationId xmlns:p14="http://schemas.microsoft.com/office/powerpoint/2010/main" val="2498148716"/>
+      </p:ext>
+    </p:extLst>
   </p:cSld>
   <p:clrMapOvr>
     <a:masterClrMapping/>
@@ -15803,38 +16422,100 @@
             <a:pPr algn="ctr"/>
             <a:r>
               <a:rPr lang="en-US" dirty="0" smtClean="0"/>
-              <a:t>Architecture of Hybrid Apps</a:t>
+              <a:t>Overview</a:t>
             </a:r>
             <a:endParaRPr lang="en-US" dirty="0"/>
           </a:p>
         </p:txBody>
       </p:sp>
-      <p:pic>
-        <p:nvPicPr>
-          <p:cNvPr id="49153" name="Picture 1" descr="G:\cpmd_hybridapps.png"/>
-          <p:cNvPicPr>
-            <a:picLocks noChangeAspect="1" noChangeArrowheads="1"/>
-          </p:cNvPicPr>
+      <p:sp>
+        <p:nvSpPr>
+          <p:cNvPr id="3" name="TextBox 2"/>
+          <p:cNvSpPr txBox="1"/>
           <p:nvPr/>
-        </p:nvPicPr>
-        <p:blipFill>
-          <a:blip r:embed="rId2"/>
-          <a:srcRect/>
-          <a:stretch>
-            <a:fillRect/>
-          </a:stretch>
-        </p:blipFill>
-        <p:spPr bwMode="auto">
+        </p:nvSpPr>
+        <p:spPr>
           <a:xfrm>
-            <a:off x="423863" y="1336221"/>
-            <a:ext cx="8296275" cy="4838700"/>
+            <a:off x="457200" y="1519084"/>
+            <a:ext cx="8229600" cy="4093428"/>
           </a:xfrm>
           <a:prstGeom prst="rect">
             <a:avLst/>
           </a:prstGeom>
           <a:noFill/>
         </p:spPr>
-      </p:pic>
+        <p:txBody>
+          <a:bodyPr wrap="square" rtlCol="0">
+            <a:spAutoFit/>
+          </a:bodyPr>
+          <a:lstStyle/>
+          <a:p>
+            <a:pPr>
+              <a:buFont typeface="Arial" pitchFamily="34" charset="0"/>
+              <a:buChar char="•"/>
+            </a:pPr>
+            <a:r>
+              <a:rPr lang="en-US" sz="2000" dirty="0" smtClean="0"/>
+              <a:t>The hybrid approach combines native development with web</a:t>
+            </a:r>
+          </a:p>
+          <a:p>
+            <a:r>
+              <a:rPr lang="en-US" sz="2000" dirty="0" smtClean="0"/>
+              <a:t>technology.</a:t>
+            </a:r>
+          </a:p>
+          <a:p>
+            <a:pPr>
+              <a:buFont typeface="Arial" pitchFamily="34" charset="0"/>
+              <a:buChar char="•"/>
+            </a:pPr>
+            <a:endParaRPr lang="en-US" sz="2000" dirty="0" smtClean="0"/>
+          </a:p>
+          <a:p>
+            <a:pPr>
+              <a:buFont typeface="Arial" pitchFamily="34" charset="0"/>
+              <a:buChar char="•"/>
+            </a:pPr>
+            <a:r>
+              <a:rPr lang="en-US" sz="2000" dirty="0" smtClean="0"/>
+              <a:t>Developers write significant portions of their application in cross-platform web technologies, while maintaining direct access to native APIs when required.</a:t>
+            </a:r>
+          </a:p>
+          <a:p>
+            <a:pPr>
+              <a:buFont typeface="Arial" pitchFamily="34" charset="0"/>
+              <a:buChar char="•"/>
+            </a:pPr>
+            <a:endParaRPr lang="en-US" sz="2000" dirty="0" smtClean="0"/>
+          </a:p>
+          <a:p>
+            <a:pPr>
+              <a:buFont typeface="Arial" pitchFamily="34" charset="0"/>
+              <a:buChar char="•"/>
+            </a:pPr>
+            <a:r>
+              <a:rPr lang="en-US" sz="2000" dirty="0" smtClean="0"/>
+              <a:t>The native portion of the app can be developed independently, whereas the web portion of the app can be either a web page that resides</a:t>
+            </a:r>
+          </a:p>
+          <a:p>
+            <a:r>
+              <a:rPr lang="en-US" sz="2000" dirty="0" smtClean="0"/>
+              <a:t>on a server.</a:t>
+            </a:r>
+          </a:p>
+          <a:p>
+            <a:endParaRPr lang="en-US" sz="2000" dirty="0" smtClean="0"/>
+          </a:p>
+          <a:p>
+            <a:endParaRPr lang="en-US" sz="2000" dirty="0" smtClean="0"/>
+          </a:p>
+          <a:p>
+            <a:endParaRPr lang="en-US" sz="2000" dirty="0"/>
+          </a:p>
+        </p:txBody>
+      </p:sp>
     </p:spTree>
   </p:cSld>
   <p:clrMapOvr>

</xml_diff>